<commit_message>
add session_1 folder and move slides, instructions, text-files folders into it
</commit_message>
<xml_diff>
--- a/cheat-sheets/overview_git_commands.pptx
+++ b/cheat-sheets/overview_git_commands.pptx
@@ -900,18 +900,18 @@
   <pc:docChgLst>
     <pc:chgData name="Lena Gschossmann" userId="bfd8fa5b3c2be1bd" providerId="LiveId" clId="{8CF21DCC-3C58-4C64-85A0-97DD11AAF9D6}"/>
     <pc:docChg chg="undo custSel addSld delSld modSld">
-      <pc:chgData name="Lena Gschossmann" userId="bfd8fa5b3c2be1bd" providerId="LiveId" clId="{8CF21DCC-3C58-4C64-85A0-97DD11AAF9D6}" dt="2024-07-03T08:13:17.510" v="1959" actId="2165"/>
+      <pc:chgData name="Lena Gschossmann" userId="bfd8fa5b3c2be1bd" providerId="LiveId" clId="{8CF21DCC-3C58-4C64-85A0-97DD11AAF9D6}" dt="2024-07-03T08:22:58.420" v="1965" actId="20577"/>
       <pc:docMkLst>
         <pc:docMk/>
       </pc:docMkLst>
       <pc:sldChg chg="addSp modSp mod">
-        <pc:chgData name="Lena Gschossmann" userId="bfd8fa5b3c2be1bd" providerId="LiveId" clId="{8CF21DCC-3C58-4C64-85A0-97DD11AAF9D6}" dt="2024-07-03T07:50:07.799" v="960" actId="1076"/>
+        <pc:chgData name="Lena Gschossmann" userId="bfd8fa5b3c2be1bd" providerId="LiveId" clId="{8CF21DCC-3C58-4C64-85A0-97DD11AAF9D6}" dt="2024-07-03T08:22:54.021" v="1962" actId="20577"/>
         <pc:sldMkLst>
           <pc:docMk/>
           <pc:sldMk cId="0" sldId="257"/>
         </pc:sldMkLst>
         <pc:spChg chg="mod">
-          <ac:chgData name="Lena Gschossmann" userId="bfd8fa5b3c2be1bd" providerId="LiveId" clId="{8CF21DCC-3C58-4C64-85A0-97DD11AAF9D6}" dt="2024-07-03T07:30:14.808" v="36" actId="1076"/>
+          <ac:chgData name="Lena Gschossmann" userId="bfd8fa5b3c2be1bd" providerId="LiveId" clId="{8CF21DCC-3C58-4C64-85A0-97DD11AAF9D6}" dt="2024-07-03T08:22:54.021" v="1962" actId="20577"/>
           <ac:spMkLst>
             <pc:docMk/>
             <pc:sldMk cId="0" sldId="257"/>
@@ -936,11 +936,19 @@
         </pc:graphicFrameChg>
       </pc:sldChg>
       <pc:sldChg chg="modSp add del mod">
-        <pc:chgData name="Lena Gschossmann" userId="bfd8fa5b3c2be1bd" providerId="LiveId" clId="{8CF21DCC-3C58-4C64-85A0-97DD11AAF9D6}" dt="2024-07-03T08:13:17.510" v="1959" actId="2165"/>
+        <pc:chgData name="Lena Gschossmann" userId="bfd8fa5b3c2be1bd" providerId="LiveId" clId="{8CF21DCC-3C58-4C64-85A0-97DD11AAF9D6}" dt="2024-07-03T08:22:58.420" v="1965" actId="20577"/>
         <pc:sldMkLst>
           <pc:docMk/>
           <pc:sldMk cId="650934325" sldId="258"/>
         </pc:sldMkLst>
+        <pc:spChg chg="mod">
+          <ac:chgData name="Lena Gschossmann" userId="bfd8fa5b3c2be1bd" providerId="LiveId" clId="{8CF21DCC-3C58-4C64-85A0-97DD11AAF9D6}" dt="2024-07-03T08:22:58.420" v="1965" actId="20577"/>
+          <ac:spMkLst>
+            <pc:docMk/>
+            <pc:sldMk cId="650934325" sldId="258"/>
+            <ac:spMk id="3" creationId="{00000000-0000-0000-0000-000000000000}"/>
+          </ac:spMkLst>
+        </pc:spChg>
         <pc:graphicFrameChg chg="mod modGraphic">
           <ac:chgData name="Lena Gschossmann" userId="bfd8fa5b3c2be1bd" providerId="LiveId" clId="{8CF21DCC-3C58-4C64-85A0-97DD11AAF9D6}" dt="2024-07-03T08:13:17.510" v="1959" actId="2165"/>
           <ac:graphicFrameMkLst>
@@ -4605,7 +4613,7 @@
                   </a:schemeClr>
                 </a:solidFill>
               </a:rPr>
-              <a:t> Bence Mitlasoczki &amp; Lena Gschossmann</a:t>
+              <a:t> Bence Mitlasoczki &amp; Lena J. Gschossmann</a:t>
             </a:r>
             <a:endParaRPr sz="2400">
               <a:solidFill>
@@ -7709,7 +7717,7 @@
                   </a:schemeClr>
                 </a:solidFill>
               </a:rPr>
-              <a:t> Bence Mitlasoczki &amp; Lena Gschossmann</a:t>
+              <a:t> Bence Mitlasoczki &amp; Lena J. Gschossmann</a:t>
             </a:r>
             <a:endParaRPr sz="2400">
               <a:solidFill>

</xml_diff>